<commit_message>
Update files via upload
</commit_message>
<xml_diff>
--- a/images/jam2in-job-posting-images.pptx
+++ b/images/jam2in-job-posting-images.pptx
@@ -9,7 +9,7 @@
     <p:sldId id="273" r:id="rId3"/>
     <p:sldId id="274" r:id="rId4"/>
     <p:sldId id="275" r:id="rId5"/>
-    <p:sldId id="276" r:id="rId6"/>
+    <p:sldId id="277" r:id="rId6"/>
   </p:sldIdLst>
   <p:sldSz cx="12192000" cy="6858000"/>
   <p:notesSz cx="6858000" cy="9144000"/>
@@ -245,7 +245,7 @@
           <a:p>
             <a:fld id="{65A0F5E7-3DC3-4D9B-9751-1720D23AB909}" type="datetimeFigureOut">
               <a:rPr lang="ko-KR" altLang="en-US" smtClean="0"/>
-              <a:t>2019-06-10</a:t>
+              <a:t>2019-06-11</a:t>
             </a:fld>
             <a:endParaRPr lang="ko-KR" altLang="en-US"/>
           </a:p>
@@ -413,7 +413,7 @@
           <a:p>
             <a:fld id="{65A0F5E7-3DC3-4D9B-9751-1720D23AB909}" type="datetimeFigureOut">
               <a:rPr lang="ko-KR" altLang="en-US" smtClean="0"/>
-              <a:t>2019-06-10</a:t>
+              <a:t>2019-06-11</a:t>
             </a:fld>
             <a:endParaRPr lang="ko-KR" altLang="en-US"/>
           </a:p>
@@ -591,7 +591,7 @@
           <a:p>
             <a:fld id="{65A0F5E7-3DC3-4D9B-9751-1720D23AB909}" type="datetimeFigureOut">
               <a:rPr lang="ko-KR" altLang="en-US" smtClean="0"/>
-              <a:t>2019-06-10</a:t>
+              <a:t>2019-06-11</a:t>
             </a:fld>
             <a:endParaRPr lang="ko-KR" altLang="en-US"/>
           </a:p>
@@ -759,7 +759,7 @@
           <a:p>
             <a:fld id="{65A0F5E7-3DC3-4D9B-9751-1720D23AB909}" type="datetimeFigureOut">
               <a:rPr lang="ko-KR" altLang="en-US" smtClean="0"/>
-              <a:t>2019-06-10</a:t>
+              <a:t>2019-06-11</a:t>
             </a:fld>
             <a:endParaRPr lang="ko-KR" altLang="en-US"/>
           </a:p>
@@ -1004,7 +1004,7 @@
           <a:p>
             <a:fld id="{65A0F5E7-3DC3-4D9B-9751-1720D23AB909}" type="datetimeFigureOut">
               <a:rPr lang="ko-KR" altLang="en-US" smtClean="0"/>
-              <a:t>2019-06-10</a:t>
+              <a:t>2019-06-11</a:t>
             </a:fld>
             <a:endParaRPr lang="ko-KR" altLang="en-US"/>
           </a:p>
@@ -1233,7 +1233,7 @@
           <a:p>
             <a:fld id="{65A0F5E7-3DC3-4D9B-9751-1720D23AB909}" type="datetimeFigureOut">
               <a:rPr lang="ko-KR" altLang="en-US" smtClean="0"/>
-              <a:t>2019-06-10</a:t>
+              <a:t>2019-06-11</a:t>
             </a:fld>
             <a:endParaRPr lang="ko-KR" altLang="en-US"/>
           </a:p>
@@ -1597,7 +1597,7 @@
           <a:p>
             <a:fld id="{65A0F5E7-3DC3-4D9B-9751-1720D23AB909}" type="datetimeFigureOut">
               <a:rPr lang="ko-KR" altLang="en-US" smtClean="0"/>
-              <a:t>2019-06-10</a:t>
+              <a:t>2019-06-11</a:t>
             </a:fld>
             <a:endParaRPr lang="ko-KR" altLang="en-US"/>
           </a:p>
@@ -1714,7 +1714,7 @@
           <a:p>
             <a:fld id="{65A0F5E7-3DC3-4D9B-9751-1720D23AB909}" type="datetimeFigureOut">
               <a:rPr lang="ko-KR" altLang="en-US" smtClean="0"/>
-              <a:t>2019-06-10</a:t>
+              <a:t>2019-06-11</a:t>
             </a:fld>
             <a:endParaRPr lang="ko-KR" altLang="en-US"/>
           </a:p>
@@ -1809,7 +1809,7 @@
           <a:p>
             <a:fld id="{65A0F5E7-3DC3-4D9B-9751-1720D23AB909}" type="datetimeFigureOut">
               <a:rPr lang="ko-KR" altLang="en-US" smtClean="0"/>
-              <a:t>2019-06-10</a:t>
+              <a:t>2019-06-11</a:t>
             </a:fld>
             <a:endParaRPr lang="ko-KR" altLang="en-US"/>
           </a:p>
@@ -2084,7 +2084,7 @@
           <a:p>
             <a:fld id="{65A0F5E7-3DC3-4D9B-9751-1720D23AB909}" type="datetimeFigureOut">
               <a:rPr lang="ko-KR" altLang="en-US" smtClean="0"/>
-              <a:t>2019-06-10</a:t>
+              <a:t>2019-06-11</a:t>
             </a:fld>
             <a:endParaRPr lang="ko-KR" altLang="en-US"/>
           </a:p>
@@ -2336,7 +2336,7 @@
           <a:p>
             <a:fld id="{65A0F5E7-3DC3-4D9B-9751-1720D23AB909}" type="datetimeFigureOut">
               <a:rPr lang="ko-KR" altLang="en-US" smtClean="0"/>
-              <a:t>2019-06-10</a:t>
+              <a:t>2019-06-11</a:t>
             </a:fld>
             <a:endParaRPr lang="ko-KR" altLang="en-US"/>
           </a:p>
@@ -2547,7 +2547,7 @@
           <a:p>
             <a:fld id="{65A0F5E7-3DC3-4D9B-9751-1720D23AB909}" type="datetimeFigureOut">
               <a:rPr lang="ko-KR" altLang="en-US" smtClean="0"/>
-              <a:t>2019-06-10</a:t>
+              <a:t>2019-06-11</a:t>
             </a:fld>
             <a:endParaRPr lang="ko-KR" altLang="en-US"/>
           </a:p>
@@ -4392,42 +4392,12 @@
           <a:chExt cx="0" cy="0"/>
         </a:xfrm>
       </p:grpSpPr>
-      <p:sp>
-        <p:nvSpPr>
-          <p:cNvPr id="11" name="TextBox 10"/>
-          <p:cNvSpPr txBox="1"/>
-          <p:nvPr/>
-        </p:nvSpPr>
-        <p:spPr>
-          <a:xfrm>
-            <a:off x="3781211" y="2867049"/>
-            <a:ext cx="3306842" cy="461665"/>
-          </a:xfrm>
-          <a:prstGeom prst="rect">
-            <a:avLst/>
-          </a:prstGeom>
-          <a:noFill/>
-        </p:spPr>
-        <p:txBody>
-          <a:bodyPr wrap="square" rtlCol="0" anchor="ctr">
-            <a:spAutoFit/>
-          </a:bodyPr>
-          <a:lstStyle/>
-          <a:p>
-            <a:pPr algn="ctr"/>
-            <a:endParaRPr lang="en-US" altLang="ko-KR" sz="2400" spc="-150" dirty="0">
-              <a:latin typeface="나눔바른고딕OTF" panose="02020603020101020101" pitchFamily="18" charset="-127"/>
-              <a:ea typeface="나눔바른고딕OTF" panose="02020603020101020101" pitchFamily="18" charset="-127"/>
-            </a:endParaRPr>
-          </a:p>
-        </p:txBody>
-      </p:sp>
       <p:grpSp>
         <p:nvGrpSpPr>
-          <p:cNvPr id="4" name="그룹 3">
+          <p:cNvPr id="8" name="그룹 7">
             <a:extLst>
               <a:ext uri="{FF2B5EF4-FFF2-40B4-BE49-F238E27FC236}">
-                <a16:creationId xmlns:a16="http://schemas.microsoft.com/office/drawing/2014/main" id="{3CA7E403-8D2D-4212-8B2E-D315574935DD}"/>
+                <a16:creationId xmlns:a16="http://schemas.microsoft.com/office/drawing/2014/main" id="{500FD870-3F0E-4BDE-8DA8-4C9FCFE9586F}"/>
               </a:ext>
             </a:extLst>
           </p:cNvPr>
@@ -4436,135 +4406,129 @@
         </p:nvGrpSpPr>
         <p:grpSpPr>
           <a:xfrm>
-            <a:off x="1269311" y="1378396"/>
-            <a:ext cx="9653378" cy="4101208"/>
-            <a:chOff x="1269311" y="1378396"/>
-            <a:chExt cx="9653378" cy="4101208"/>
+            <a:off x="1810892" y="1378396"/>
+            <a:ext cx="7948990" cy="4101208"/>
+            <a:chOff x="1567543" y="1091682"/>
+            <a:chExt cx="7948990" cy="4101208"/>
           </a:xfrm>
         </p:grpSpPr>
+        <p:sp>
+          <p:nvSpPr>
+            <p:cNvPr id="2" name="직사각형 1"/>
+            <p:cNvSpPr/>
+            <p:nvPr/>
+          </p:nvSpPr>
+          <p:spPr>
+            <a:xfrm>
+              <a:off x="1567543" y="1091682"/>
+              <a:ext cx="7948990" cy="4101208"/>
+            </a:xfrm>
+            <a:prstGeom prst="rect">
+              <a:avLst/>
+            </a:prstGeom>
+            <a:gradFill flip="none" rotWithShape="1">
+              <a:gsLst>
+                <a:gs pos="0">
+                  <a:schemeClr val="accent1">
+                    <a:lumMod val="5000"/>
+                    <a:lumOff val="95000"/>
+                  </a:schemeClr>
+                </a:gs>
+                <a:gs pos="74000">
+                  <a:schemeClr val="accent1">
+                    <a:lumMod val="45000"/>
+                    <a:lumOff val="55000"/>
+                  </a:schemeClr>
+                </a:gs>
+                <a:gs pos="83000">
+                  <a:schemeClr val="accent1">
+                    <a:lumMod val="45000"/>
+                    <a:lumOff val="55000"/>
+                  </a:schemeClr>
+                </a:gs>
+                <a:gs pos="100000">
+                  <a:schemeClr val="accent1">
+                    <a:lumMod val="30000"/>
+                    <a:lumOff val="70000"/>
+                  </a:schemeClr>
+                </a:gs>
+              </a:gsLst>
+              <a:lin ang="5400000" scaled="1"/>
+              <a:tileRect/>
+            </a:gradFill>
+            <a:ln>
+              <a:noFill/>
+            </a:ln>
+          </p:spPr>
+          <p:style>
+            <a:lnRef idx="2">
+              <a:schemeClr val="accent1">
+                <a:shade val="50000"/>
+              </a:schemeClr>
+            </a:lnRef>
+            <a:fillRef idx="1">
+              <a:schemeClr val="accent1"/>
+            </a:fillRef>
+            <a:effectRef idx="0">
+              <a:schemeClr val="accent1"/>
+            </a:effectRef>
+            <a:fontRef idx="minor">
+              <a:schemeClr val="lt1"/>
+            </a:fontRef>
+          </p:style>
+          <p:txBody>
+            <a:bodyPr rtlCol="0" anchor="ctr"/>
+            <a:lstStyle/>
+            <a:p>
+              <a:pPr algn="ctr"/>
+              <a:endParaRPr lang="ko-KR" altLang="en-US" dirty="0"/>
+            </a:p>
+          </p:txBody>
+        </p:sp>
+        <p:pic>
+          <p:nvPicPr>
+            <p:cNvPr id="3" name="그림 2"/>
+            <p:cNvPicPr>
+              <a:picLocks noChangeAspect="1"/>
+            </p:cNvPicPr>
+            <p:nvPr/>
+          </p:nvPicPr>
+          <p:blipFill>
+            <a:blip r:embed="rId2" cstate="print">
+              <a:extLst>
+                <a:ext uri="{28A0092B-C50C-407E-A947-70E740481C1C}">
+                  <a14:useLocalDpi xmlns:a14="http://schemas.microsoft.com/office/drawing/2010/main" val="0"/>
+                </a:ext>
+              </a:extLst>
+            </a:blip>
+            <a:stretch>
+              <a:fillRect/>
+            </a:stretch>
+          </p:blipFill>
+          <p:spPr>
+            <a:xfrm>
+              <a:off x="2957320" y="1673744"/>
+              <a:ext cx="4954624" cy="548666"/>
+            </a:xfrm>
+            <a:prstGeom prst="rect">
+              <a:avLst/>
+            </a:prstGeom>
+          </p:spPr>
+        </p:pic>
         <p:grpSp>
           <p:nvGrpSpPr>
-            <p:cNvPr id="16" name="그룹 15">
-              <a:extLst>
-                <a:ext uri="{FF2B5EF4-FFF2-40B4-BE49-F238E27FC236}">
-                  <a16:creationId xmlns:a16="http://schemas.microsoft.com/office/drawing/2014/main" id="{7EE0F14D-20D4-4802-AA8D-341A20D2C56A}"/>
-                </a:ext>
-              </a:extLst>
-            </p:cNvPr>
+            <p:cNvPr id="4" name="그룹 3"/>
             <p:cNvGrpSpPr/>
             <p:nvPr/>
           </p:nvGrpSpPr>
           <p:grpSpPr>
             <a:xfrm>
-              <a:off x="1269311" y="1378396"/>
-              <a:ext cx="9653378" cy="4101208"/>
-              <a:chOff x="1269311" y="1047277"/>
-              <a:chExt cx="9653378" cy="4101208"/>
+              <a:off x="2635417" y="2343829"/>
+              <a:ext cx="5813241" cy="523220"/>
+              <a:chOff x="2888739" y="2343829"/>
+              <a:chExt cx="5813241" cy="523220"/>
             </a:xfrm>
           </p:grpSpPr>
-          <p:sp>
-            <p:nvSpPr>
-              <p:cNvPr id="2" name="직사각형 1"/>
-              <p:cNvSpPr/>
-              <p:nvPr/>
-            </p:nvSpPr>
-            <p:spPr>
-              <a:xfrm>
-                <a:off x="1269311" y="1047277"/>
-                <a:ext cx="9653378" cy="4101208"/>
-              </a:xfrm>
-              <a:prstGeom prst="rect">
-                <a:avLst/>
-              </a:prstGeom>
-              <a:gradFill flip="none" rotWithShape="1">
-                <a:gsLst>
-                  <a:gs pos="0">
-                    <a:schemeClr val="accent1">
-                      <a:lumMod val="5000"/>
-                      <a:lumOff val="95000"/>
-                    </a:schemeClr>
-                  </a:gs>
-                  <a:gs pos="74000">
-                    <a:schemeClr val="accent1">
-                      <a:lumMod val="45000"/>
-                      <a:lumOff val="55000"/>
-                    </a:schemeClr>
-                  </a:gs>
-                  <a:gs pos="83000">
-                    <a:schemeClr val="accent1">
-                      <a:lumMod val="45000"/>
-                      <a:lumOff val="55000"/>
-                    </a:schemeClr>
-                  </a:gs>
-                  <a:gs pos="100000">
-                    <a:schemeClr val="accent1">
-                      <a:lumMod val="30000"/>
-                      <a:lumOff val="70000"/>
-                    </a:schemeClr>
-                  </a:gs>
-                </a:gsLst>
-                <a:lin ang="5400000" scaled="1"/>
-                <a:tileRect/>
-              </a:gradFill>
-              <a:ln>
-                <a:noFill/>
-              </a:ln>
-            </p:spPr>
-            <p:style>
-              <a:lnRef idx="2">
-                <a:schemeClr val="accent1">
-                  <a:shade val="50000"/>
-                </a:schemeClr>
-              </a:lnRef>
-              <a:fillRef idx="1">
-                <a:schemeClr val="accent1"/>
-              </a:fillRef>
-              <a:effectRef idx="0">
-                <a:schemeClr val="accent1"/>
-              </a:effectRef>
-              <a:fontRef idx="minor">
-                <a:schemeClr val="lt1"/>
-              </a:fontRef>
-            </p:style>
-            <p:txBody>
-              <a:bodyPr rtlCol="0" anchor="ctr"/>
-              <a:lstStyle/>
-              <a:p>
-                <a:pPr algn="ctr"/>
-                <a:endParaRPr lang="ko-KR" altLang="en-US" dirty="0"/>
-              </a:p>
-            </p:txBody>
-          </p:sp>
-          <p:pic>
-            <p:nvPicPr>
-              <p:cNvPr id="3" name="그림 2"/>
-              <p:cNvPicPr>
-                <a:picLocks noChangeAspect="1"/>
-              </p:cNvPicPr>
-              <p:nvPr/>
-            </p:nvPicPr>
-            <p:blipFill>
-              <a:blip r:embed="rId2" cstate="print">
-                <a:extLst>
-                  <a:ext uri="{28A0092B-C50C-407E-A947-70E740481C1C}">
-                    <a14:useLocalDpi xmlns:a14="http://schemas.microsoft.com/office/drawing/2010/main" val="0"/>
-                  </a:ext>
-                </a:extLst>
-              </a:blip>
-              <a:stretch>
-                <a:fillRect/>
-              </a:stretch>
-            </p:blipFill>
-            <p:spPr>
-              <a:xfrm>
-                <a:off x="3618688" y="1500287"/>
-                <a:ext cx="4954624" cy="548666"/>
-              </a:xfrm>
-              <a:prstGeom prst="rect">
-                <a:avLst/>
-              </a:prstGeom>
-            </p:spPr>
-          </p:pic>
           <p:sp>
             <p:nvSpPr>
               <p:cNvPr id="5" name="TextBox 4"/>
@@ -4573,8 +4537,8 @@
             </p:nvSpPr>
             <p:spPr>
               <a:xfrm>
-                <a:off x="3158090" y="2238529"/>
-                <a:ext cx="4188825" cy="523220"/>
+                <a:off x="2888739" y="2343829"/>
+                <a:ext cx="4212607" cy="523220"/>
               </a:xfrm>
               <a:prstGeom prst="rect">
                 <a:avLst/>
@@ -4588,247 +4552,218 @@
               <a:lstStyle/>
               <a:p>
                 <a:r>
-                  <a:rPr lang="en-US" altLang="ko-KR" sz="2800" dirty="0">
-                    <a:latin typeface="나눔바른고딕" panose="020B0603020101020101" pitchFamily="50" charset="-127"/>
-                    <a:ea typeface="나눔바른고딕" panose="020B0603020101020101" pitchFamily="50" charset="-127"/>
+                  <a:rPr lang="en-US" altLang="ko-KR" sz="2800" spc="-150" dirty="0">
+                    <a:latin typeface="나눔바른고딕OTF" panose="02020603020101020101" pitchFamily="18" charset="-127"/>
+                    <a:ea typeface="나눔바른고딕OTF" panose="02020603020101020101" pitchFamily="18" charset="-127"/>
                   </a:rPr>
-                  <a:t>ARCUS </a:t>
+                  <a:t>ARCUS</a:t>
                 </a:r>
                 <a:r>
-                  <a:rPr lang="ko-KR" altLang="en-US" sz="2800" dirty="0">
-                    <a:latin typeface="나눔바른고딕" panose="020B0603020101020101" pitchFamily="50" charset="-127"/>
-                    <a:ea typeface="나눔바른고딕" panose="020B0603020101020101" pitchFamily="50" charset="-127"/>
+                  <a:rPr lang="ko-KR" altLang="en-US" sz="2800" spc="-150" dirty="0">
+                    <a:latin typeface="나눔바른고딕OTF" panose="02020603020101020101" pitchFamily="18" charset="-127"/>
+                    <a:ea typeface="나눔바른고딕OTF" panose="02020603020101020101" pitchFamily="18" charset="-127"/>
                   </a:rPr>
-                  <a:t>응용개발자 채용 </a:t>
+                  <a:t> 응용개발자 채용 </a:t>
                 </a:r>
                 <a:r>
-                  <a:rPr lang="en-US" altLang="ko-KR" sz="2800" dirty="0">
-                    <a:latin typeface="나눔바른고딕" panose="020B0603020101020101" pitchFamily="50" charset="-127"/>
-                    <a:ea typeface="나눔바른고딕" panose="020B0603020101020101" pitchFamily="50" charset="-127"/>
+                  <a:rPr lang="en-US" altLang="ko-KR" sz="2800" spc="-150" dirty="0">
+                    <a:latin typeface="나눔바른고딕OTF" panose="02020603020101020101" pitchFamily="18" charset="-127"/>
+                    <a:ea typeface="나눔바른고딕OTF" panose="02020603020101020101" pitchFamily="18" charset="-127"/>
                   </a:rPr>
-                  <a:t>@ </a:t>
+                  <a:t>@</a:t>
                 </a:r>
                 <a:endParaRPr lang="ko-KR" altLang="en-US" sz="2800" dirty="0">
-                  <a:latin typeface="나눔바른고딕" panose="020B0603020101020101" pitchFamily="50" charset="-127"/>
-                  <a:ea typeface="나눔바른고딕" panose="020B0603020101020101" pitchFamily="50" charset="-127"/>
+                  <a:latin typeface="나눔바른고딕OTF" panose="02020603020101020101" pitchFamily="18" charset="-127"/>
+                  <a:ea typeface="나눔바른고딕OTF" panose="02020603020101020101" pitchFamily="18" charset="-127"/>
                 </a:endParaRPr>
               </a:p>
             </p:txBody>
           </p:sp>
-          <p:sp>
-            <p:nvSpPr>
-              <p:cNvPr id="10" name="TextBox 9"/>
-              <p:cNvSpPr txBox="1"/>
+          <p:pic>
+            <p:nvPicPr>
+              <p:cNvPr id="6" name="그림 5"/>
+              <p:cNvPicPr>
+                <a:picLocks noChangeAspect="1"/>
+              </p:cNvPicPr>
               <p:nvPr/>
-            </p:nvSpPr>
+            </p:nvPicPr>
+            <p:blipFill>
+              <a:blip r:embed="rId3" cstate="print">
+                <a:extLst>
+                  <a:ext uri="{28A0092B-C50C-407E-A947-70E740481C1C}">
+                    <a14:useLocalDpi xmlns:a14="http://schemas.microsoft.com/office/drawing/2010/main" val="0"/>
+                  </a:ext>
+                </a:extLst>
+              </a:blip>
+              <a:stretch>
+                <a:fillRect/>
+              </a:stretch>
+            </p:blipFill>
             <p:spPr>
               <a:xfrm>
-                <a:off x="1648697" y="3742309"/>
-                <a:ext cx="8894601" cy="707886"/>
+                <a:off x="7105859" y="2417603"/>
+                <a:ext cx="1596121" cy="385729"/>
               </a:xfrm>
               <a:prstGeom prst="rect">
                 <a:avLst/>
               </a:prstGeom>
-              <a:noFill/>
             </p:spPr>
-            <p:txBody>
-              <a:bodyPr wrap="square" rtlCol="0" anchor="ctr">
-                <a:spAutoFit/>
-              </a:bodyPr>
-              <a:lstStyle/>
-              <a:p>
-                <a:r>
-                  <a:rPr lang="en-US" altLang="ko-KR" sz="2000" dirty="0">
-                    <a:latin typeface="나눔바른고딕" panose="020B0603020101020101" pitchFamily="50" charset="-127"/>
-                    <a:ea typeface="나눔바른고딕" panose="020B0603020101020101" pitchFamily="50" charset="-127"/>
-                  </a:rPr>
-                  <a:t>ARCUS </a:t>
-                </a:r>
-                <a:r>
-                  <a:rPr lang="ko-KR" altLang="en-US" sz="2000" dirty="0">
-                    <a:latin typeface="나눔바른고딕" panose="020B0603020101020101" pitchFamily="50" charset="-127"/>
-                    <a:ea typeface="나눔바른고딕" panose="020B0603020101020101" pitchFamily="50" charset="-127"/>
-                  </a:rPr>
-                  <a:t>사용 확대를 위한 공통 모듈과 도구 개발</a:t>
-                </a:r>
-                <a:r>
-                  <a:rPr lang="en-US" altLang="ko-KR" sz="2000" dirty="0">
-                    <a:latin typeface="나눔바른고딕" panose="020B0603020101020101" pitchFamily="50" charset="-127"/>
-                    <a:ea typeface="나눔바른고딕" panose="020B0603020101020101" pitchFamily="50" charset="-127"/>
-                  </a:rPr>
-                  <a:t>, </a:t>
-                </a:r>
-                <a:r>
-                  <a:rPr lang="ko-KR" altLang="en-US" sz="2000" dirty="0">
-                    <a:latin typeface="나눔바른고딕" panose="020B0603020101020101" pitchFamily="50" charset="-127"/>
-                    <a:ea typeface="나눔바른고딕" panose="020B0603020101020101" pitchFamily="50" charset="-127"/>
-                  </a:rPr>
-                  <a:t>클라우드 환경에서의 </a:t>
-                </a:r>
-                <a:r>
-                  <a:rPr lang="en-US" altLang="ko-KR" sz="2000" dirty="0">
-                    <a:latin typeface="나눔바른고딕" panose="020B0603020101020101" pitchFamily="50" charset="-127"/>
-                    <a:ea typeface="나눔바른고딕" panose="020B0603020101020101" pitchFamily="50" charset="-127"/>
-                  </a:rPr>
-                  <a:t>ARCUS </a:t>
-                </a:r>
-                <a:r>
-                  <a:rPr lang="ko-KR" altLang="en-US" sz="2000" dirty="0">
-                    <a:latin typeface="나눔바른고딕" panose="020B0603020101020101" pitchFamily="50" charset="-127"/>
-                    <a:ea typeface="나눔바른고딕" panose="020B0603020101020101" pitchFamily="50" charset="-127"/>
-                  </a:rPr>
-                  <a:t>서비스 </a:t>
-                </a:r>
-                <a:endParaRPr lang="en-US" altLang="ko-KR" sz="2000" dirty="0">
-                  <a:latin typeface="나눔바른고딕" panose="020B0603020101020101" pitchFamily="50" charset="-127"/>
-                  <a:ea typeface="나눔바른고딕" panose="020B0603020101020101" pitchFamily="50" charset="-127"/>
-                </a:endParaRPr>
-              </a:p>
-              <a:p>
-                <a:r>
-                  <a:rPr lang="ko-KR" altLang="en-US" sz="2000" dirty="0">
-                    <a:latin typeface="나눔바른고딕" panose="020B0603020101020101" pitchFamily="50" charset="-127"/>
-                    <a:ea typeface="나눔바른고딕" panose="020B0603020101020101" pitchFamily="50" charset="-127"/>
-                  </a:rPr>
-                  <a:t>개발</a:t>
-                </a:r>
-                <a:r>
-                  <a:rPr lang="en-US" altLang="ko-KR" sz="2000" dirty="0">
-                    <a:latin typeface="나눔바른고딕" panose="020B0603020101020101" pitchFamily="50" charset="-127"/>
-                    <a:ea typeface="나눔바른고딕" panose="020B0603020101020101" pitchFamily="50" charset="-127"/>
-                  </a:rPr>
-                  <a:t>, </a:t>
-                </a:r>
-                <a:r>
-                  <a:rPr lang="ko-KR" altLang="en-US" sz="2000" dirty="0">
-                    <a:latin typeface="나눔바른고딕" panose="020B0603020101020101" pitchFamily="50" charset="-127"/>
-                    <a:ea typeface="나눔바른고딕" panose="020B0603020101020101" pitchFamily="50" charset="-127"/>
-                  </a:rPr>
-                  <a:t>그 외 다양한 응용 기술들을 </a:t>
-                </a:r>
-                <a:r>
-                  <a:rPr lang="ko-KR" altLang="en-US" sz="2000" dirty="0" err="1">
-                    <a:latin typeface="나눔바른고딕" panose="020B0603020101020101" pitchFamily="50" charset="-127"/>
-                    <a:ea typeface="나눔바른고딕" panose="020B0603020101020101" pitchFamily="50" charset="-127"/>
-                  </a:rPr>
-                  <a:t>만들어나갈</a:t>
-                </a:r>
-                <a:r>
-                  <a:rPr lang="ko-KR" altLang="en-US" sz="2000" dirty="0">
-                    <a:latin typeface="나눔바른고딕" panose="020B0603020101020101" pitchFamily="50" charset="-127"/>
-                    <a:ea typeface="나눔바른고딕" panose="020B0603020101020101" pitchFamily="50" charset="-127"/>
-                  </a:rPr>
-                  <a:t> </a:t>
-                </a:r>
-                <a:r>
-                  <a:rPr lang="en-US" altLang="ko-KR" sz="2000" dirty="0">
-                    <a:latin typeface="나눔바른고딕" panose="020B0603020101020101" pitchFamily="50" charset="-127"/>
-                    <a:ea typeface="나눔바른고딕" panose="020B0603020101020101" pitchFamily="50" charset="-127"/>
-                  </a:rPr>
-                  <a:t>ARCUS</a:t>
-                </a:r>
-                <a:r>
-                  <a:rPr lang="ko-KR" altLang="en-US" sz="2000" dirty="0">
-                    <a:latin typeface="나눔바른고딕" panose="020B0603020101020101" pitchFamily="50" charset="-127"/>
-                    <a:ea typeface="나눔바른고딕" panose="020B0603020101020101" pitchFamily="50" charset="-127"/>
-                  </a:rPr>
-                  <a:t> 응용 개발자를 모집합니다</a:t>
-                </a:r>
-                <a:r>
-                  <a:rPr lang="en-US" altLang="ko-KR" sz="2000" dirty="0">
-                    <a:latin typeface="나눔바른고딕" panose="020B0603020101020101" pitchFamily="50" charset="-127"/>
-                    <a:ea typeface="나눔바른고딕" panose="020B0603020101020101" pitchFamily="50" charset="-127"/>
-                  </a:rPr>
-                  <a:t>.</a:t>
-                </a:r>
-              </a:p>
-            </p:txBody>
-          </p:sp>
-          <p:sp>
-            <p:nvSpPr>
-              <p:cNvPr id="15" name="TextBox 14">
-                <a:extLst>
-                  <a:ext uri="{FF2B5EF4-FFF2-40B4-BE49-F238E27FC236}">
-                    <a16:creationId xmlns:a16="http://schemas.microsoft.com/office/drawing/2014/main" id="{3CE07A17-2E86-4222-BEAF-0FD6B46B0FB2}"/>
-                  </a:ext>
-                </a:extLst>
-              </p:cNvPr>
-              <p:cNvSpPr txBox="1"/>
-              <p:nvPr/>
-            </p:nvSpPr>
-            <p:spPr>
-              <a:xfrm>
-                <a:off x="4001586" y="2761748"/>
-                <a:ext cx="4188825" cy="523220"/>
-              </a:xfrm>
-              <a:prstGeom prst="rect">
-                <a:avLst/>
-              </a:prstGeom>
-              <a:noFill/>
-            </p:spPr>
-            <p:txBody>
-              <a:bodyPr wrap="square" rtlCol="0" anchor="ctr">
-                <a:spAutoFit/>
-              </a:bodyPr>
-              <a:lstStyle/>
-              <a:p>
-                <a:pPr algn="ctr"/>
-                <a:r>
-                  <a:rPr lang="en-US" altLang="ko-KR" sz="2800" dirty="0">
-                    <a:latin typeface="나눔바른고딕" panose="020B0603020101020101" pitchFamily="50" charset="-127"/>
-                    <a:ea typeface="나눔바른고딕" panose="020B0603020101020101" pitchFamily="50" charset="-127"/>
-                  </a:rPr>
-                  <a:t>(2019 6/11 ~ 6/30)</a:t>
-                </a:r>
-                <a:endParaRPr lang="ko-KR" altLang="en-US" sz="2800" dirty="0">
-                  <a:latin typeface="나눔바른고딕" panose="020B0603020101020101" pitchFamily="50" charset="-127"/>
-                  <a:ea typeface="나눔바른고딕" panose="020B0603020101020101" pitchFamily="50" charset="-127"/>
-                </a:endParaRPr>
-              </a:p>
-            </p:txBody>
-          </p:sp>
+          </p:pic>
         </p:grpSp>
-        <p:pic>
-          <p:nvPicPr>
-            <p:cNvPr id="12" name="그림 11">
-              <a:extLst>
-                <a:ext uri="{FF2B5EF4-FFF2-40B4-BE49-F238E27FC236}">
-                  <a16:creationId xmlns:a16="http://schemas.microsoft.com/office/drawing/2014/main" id="{5FFB89BC-1E43-46F8-B710-A98076681D08}"/>
-                </a:ext>
-              </a:extLst>
-            </p:cNvPr>
-            <p:cNvPicPr>
-              <a:picLocks noChangeAspect="1"/>
-            </p:cNvPicPr>
+        <p:sp>
+          <p:nvSpPr>
+            <p:cNvPr id="10" name="TextBox 9"/>
+            <p:cNvSpPr txBox="1"/>
             <p:nvPr/>
-          </p:nvPicPr>
-          <p:blipFill>
-            <a:blip r:embed="rId3" cstate="print">
-              <a:extLst>
-                <a:ext uri="{28A0092B-C50C-407E-A947-70E740481C1C}">
-                  <a14:useLocalDpi xmlns:a14="http://schemas.microsoft.com/office/drawing/2010/main" val="0"/>
-                </a:ext>
-              </a:extLst>
-            </a:blip>
-            <a:stretch>
-              <a:fillRect/>
-            </a:stretch>
-          </p:blipFill>
+          </p:nvSpPr>
           <p:spPr>
             <a:xfrm>
-              <a:off x="7346915" y="2632198"/>
-              <a:ext cx="1596121" cy="385729"/>
+              <a:off x="1901371" y="3621421"/>
+              <a:ext cx="7281333" cy="1015663"/>
             </a:xfrm>
             <a:prstGeom prst="rect">
               <a:avLst/>
             </a:prstGeom>
+            <a:noFill/>
           </p:spPr>
-        </p:pic>
+          <p:txBody>
+            <a:bodyPr wrap="square" rtlCol="0" anchor="ctr">
+              <a:spAutoFit/>
+            </a:bodyPr>
+            <a:lstStyle/>
+            <a:p>
+              <a:r>
+                <a:rPr lang="en-US" altLang="ko-KR" sz="2000" dirty="0">
+                  <a:latin typeface="나눔바른고딕OTF" panose="02020603020101020101" pitchFamily="18" charset="-127"/>
+                  <a:ea typeface="나눔바른고딕OTF" panose="02020603020101020101" pitchFamily="18" charset="-127"/>
+                </a:rPr>
+                <a:t>ARCUS </a:t>
+              </a:r>
+              <a:r>
+                <a:rPr lang="ko-KR" altLang="en-US" sz="2000" dirty="0">
+                  <a:latin typeface="나눔바른고딕OTF" panose="02020603020101020101" pitchFamily="18" charset="-127"/>
+                  <a:ea typeface="나눔바른고딕OTF" panose="02020603020101020101" pitchFamily="18" charset="-127"/>
+                </a:rPr>
+                <a:t>사용 확대를 위한 공통 모듈과 도구 개발</a:t>
+              </a:r>
+              <a:r>
+                <a:rPr lang="en-US" altLang="ko-KR" sz="2000" dirty="0">
+                  <a:latin typeface="나눔바른고딕OTF" panose="02020603020101020101" pitchFamily="18" charset="-127"/>
+                  <a:ea typeface="나눔바른고딕OTF" panose="02020603020101020101" pitchFamily="18" charset="-127"/>
+                </a:rPr>
+                <a:t>, </a:t>
+              </a:r>
+              <a:r>
+                <a:rPr lang="ko-KR" altLang="en-US" sz="2000" dirty="0">
+                  <a:latin typeface="나눔바른고딕OTF" panose="02020603020101020101" pitchFamily="18" charset="-127"/>
+                  <a:ea typeface="나눔바른고딕OTF" panose="02020603020101020101" pitchFamily="18" charset="-127"/>
+                </a:rPr>
+                <a:t>클라우드 환경에서의 </a:t>
+              </a:r>
+              <a:r>
+                <a:rPr lang="en-US" altLang="ko-KR" sz="2000" dirty="0">
+                  <a:latin typeface="나눔바른고딕OTF" panose="02020603020101020101" pitchFamily="18" charset="-127"/>
+                  <a:ea typeface="나눔바른고딕OTF" panose="02020603020101020101" pitchFamily="18" charset="-127"/>
+                </a:rPr>
+                <a:t>ARCUS </a:t>
+              </a:r>
+              <a:r>
+                <a:rPr lang="ko-KR" altLang="en-US" sz="2000" dirty="0">
+                  <a:latin typeface="나눔바른고딕OTF" panose="02020603020101020101" pitchFamily="18" charset="-127"/>
+                  <a:ea typeface="나눔바른고딕OTF" panose="02020603020101020101" pitchFamily="18" charset="-127"/>
+                </a:rPr>
+                <a:t>서비스 개발</a:t>
+              </a:r>
+              <a:r>
+                <a:rPr lang="en-US" altLang="ko-KR" sz="2000" dirty="0">
+                  <a:latin typeface="나눔바른고딕OTF" panose="02020603020101020101" pitchFamily="18" charset="-127"/>
+                  <a:ea typeface="나눔바른고딕OTF" panose="02020603020101020101" pitchFamily="18" charset="-127"/>
+                </a:rPr>
+                <a:t>, </a:t>
+              </a:r>
+              <a:r>
+                <a:rPr lang="ko-KR" altLang="en-US" sz="2000" dirty="0">
+                  <a:latin typeface="나눔바른고딕OTF" panose="02020603020101020101" pitchFamily="18" charset="-127"/>
+                  <a:ea typeface="나눔바른고딕OTF" panose="02020603020101020101" pitchFamily="18" charset="-127"/>
+                </a:rPr>
+                <a:t>그 외 다양한 응용 기술들을 </a:t>
+              </a:r>
+              <a:r>
+                <a:rPr lang="ko-KR" altLang="en-US" sz="2000" dirty="0" err="1">
+                  <a:latin typeface="나눔바른고딕OTF" panose="02020603020101020101" pitchFamily="18" charset="-127"/>
+                  <a:ea typeface="나눔바른고딕OTF" panose="02020603020101020101" pitchFamily="18" charset="-127"/>
+                </a:rPr>
+                <a:t>만들어나갈</a:t>
+              </a:r>
+              <a:r>
+                <a:rPr lang="ko-KR" altLang="en-US" sz="2000" dirty="0">
+                  <a:latin typeface="나눔바른고딕OTF" panose="02020603020101020101" pitchFamily="18" charset="-127"/>
+                  <a:ea typeface="나눔바른고딕OTF" panose="02020603020101020101" pitchFamily="18" charset="-127"/>
+                </a:rPr>
+                <a:t> </a:t>
+              </a:r>
+              <a:r>
+                <a:rPr lang="en-US" altLang="ko-KR" sz="2000" dirty="0">
+                  <a:latin typeface="나눔바른고딕OTF" panose="02020603020101020101" pitchFamily="18" charset="-127"/>
+                  <a:ea typeface="나눔바른고딕OTF" panose="02020603020101020101" pitchFamily="18" charset="-127"/>
+                </a:rPr>
+                <a:t>ARCUS </a:t>
+              </a:r>
+              <a:r>
+                <a:rPr lang="ko-KR" altLang="en-US" sz="2000" dirty="0">
+                  <a:latin typeface="나눔바른고딕OTF" panose="02020603020101020101" pitchFamily="18" charset="-127"/>
+                  <a:ea typeface="나눔바른고딕OTF" panose="02020603020101020101" pitchFamily="18" charset="-127"/>
+                </a:rPr>
+                <a:t>응용개발자를 모집합니다</a:t>
+              </a:r>
+              <a:r>
+                <a:rPr lang="en-US" altLang="ko-KR" sz="2000" dirty="0">
+                  <a:latin typeface="나눔바른고딕OTF" panose="02020603020101020101" pitchFamily="18" charset="-127"/>
+                  <a:ea typeface="나눔바른고딕OTF" panose="02020603020101020101" pitchFamily="18" charset="-127"/>
+                </a:rPr>
+                <a:t>.</a:t>
+              </a:r>
+            </a:p>
+          </p:txBody>
+        </p:sp>
+        <p:sp>
+          <p:nvSpPr>
+            <p:cNvPr id="11" name="TextBox 10"/>
+            <p:cNvSpPr txBox="1"/>
+            <p:nvPr/>
+          </p:nvSpPr>
+          <p:spPr>
+            <a:xfrm>
+              <a:off x="3888617" y="2850181"/>
+              <a:ext cx="3306842" cy="461665"/>
+            </a:xfrm>
+            <a:prstGeom prst="rect">
+              <a:avLst/>
+            </a:prstGeom>
+            <a:noFill/>
+          </p:spPr>
+          <p:txBody>
+            <a:bodyPr wrap="square" rtlCol="0" anchor="ctr">
+              <a:spAutoFit/>
+            </a:bodyPr>
+            <a:lstStyle/>
+            <a:p>
+              <a:pPr algn="ctr"/>
+              <a:r>
+                <a:rPr lang="en-US" altLang="ko-KR" sz="2400" spc="-150" dirty="0">
+                  <a:latin typeface="나눔바른고딕OTF" panose="02020603020101020101" pitchFamily="18" charset="-127"/>
+                  <a:ea typeface="나눔바른고딕OTF" panose="02020603020101020101" pitchFamily="18" charset="-127"/>
+                </a:rPr>
+                <a:t>(2019  6/11 ~ 6/30)</a:t>
+              </a:r>
+            </a:p>
+          </p:txBody>
+        </p:sp>
       </p:grpSp>
     </p:spTree>
     <p:extLst>
       <p:ext uri="{BB962C8B-B14F-4D97-AF65-F5344CB8AC3E}">
-        <p14:creationId xmlns:p14="http://schemas.microsoft.com/office/powerpoint/2010/main" val="3492641089"/>
+        <p14:creationId xmlns:p14="http://schemas.microsoft.com/office/powerpoint/2010/main" val="1581193422"/>
       </p:ext>
     </p:extLst>
   </p:cSld>

</xml_diff>